<commit_message>
Actualización mapa conceptual fórmulas
Se elimina una copia del cuaderno de estudio de una versión anterior.
Se agregan fórmulas a la carpeta del mapa conceptual.
Se actualiza el mapa conceptual para que se puedan ubicar las fórmulas
correspondientes.
</commit_message>
<xml_diff>
--- a/fuentes/contenidos/grado08/guion03/MA_08_03_CO_REC310.pptx
+++ b/fuentes/contenidos/grado08/guion03/MA_08_03_CO_REC310.pptx
@@ -450,7 +450,7 @@
           <a:p>
             <a:fld id="{5001C876-01F7-4317-94B9-1AE222133113}" type="datetimeFigureOut">
               <a:rPr lang="es-ES" smtClean="0"/>
-              <a:t>26/10/2015</a:t>
+              <a:t>04/11/2015</a:t>
             </a:fld>
             <a:endParaRPr lang="es-ES" dirty="0"/>
           </a:p>
@@ -1300,16 +1300,6 @@
               </a:rPr>
               <a:t>n</a:t>
             </a:r>
-            <a:r>
-              <a:rPr lang="es-ES" sz="800" dirty="0" smtClean="0">
-                <a:solidFill>
-                  <a:schemeClr val="tx1"/>
-                </a:solidFill>
-                <a:latin typeface="Arial" panose="020B0604020202020204" pitchFamily="34" charset="0"/>
-                <a:cs typeface="Arial" panose="020B0604020202020204" pitchFamily="34" charset="0"/>
-              </a:rPr>
-              <a:t>.</a:t>
-            </a:r>
             <a:endParaRPr lang="es-ES" sz="800" dirty="0">
               <a:solidFill>
                 <a:schemeClr val="tx1"/>
@@ -1609,7 +1599,17 @@
                 <a:latin typeface="Arial" panose="020B0604020202020204" pitchFamily="34" charset="0"/>
                 <a:cs typeface="Arial" panose="020B0604020202020204" pitchFamily="34" charset="0"/>
               </a:rPr>
-              <a:t> es un número par.</a:t>
+              <a:t> es un número </a:t>
+            </a:r>
+            <a:r>
+              <a:rPr lang="es-ES" sz="800" dirty="0" smtClean="0">
+                <a:solidFill>
+                  <a:schemeClr val="tx1"/>
+                </a:solidFill>
+                <a:latin typeface="Arial" panose="020B0604020202020204" pitchFamily="34" charset="0"/>
+                <a:cs typeface="Arial" panose="020B0604020202020204" pitchFamily="34" charset="0"/>
+              </a:rPr>
+              <a:t>par</a:t>
             </a:r>
             <a:endParaRPr lang="es-ES" sz="800" dirty="0">
               <a:solidFill>
@@ -1690,7 +1690,17 @@
                 <a:latin typeface="Arial" panose="020B0604020202020204" pitchFamily="34" charset="0"/>
                 <a:cs typeface="Arial" panose="020B0604020202020204" pitchFamily="34" charset="0"/>
               </a:rPr>
-              <a:t> es un número impar.</a:t>
+              <a:t> es un número </a:t>
+            </a:r>
+            <a:r>
+              <a:rPr lang="es-ES" sz="800" dirty="0" smtClean="0">
+                <a:solidFill>
+                  <a:schemeClr val="tx1"/>
+                </a:solidFill>
+                <a:latin typeface="Arial" panose="020B0604020202020204" pitchFamily="34" charset="0"/>
+                <a:cs typeface="Arial" panose="020B0604020202020204" pitchFamily="34" charset="0"/>
+              </a:rPr>
+              <a:t>impar</a:t>
             </a:r>
             <a:endParaRPr lang="es-ES" sz="900" dirty="0">
               <a:solidFill>
@@ -3576,7 +3586,7 @@
         <p:spPr>
           <a:xfrm>
             <a:off x="141774" y="4421096"/>
-            <a:ext cx="1242792" cy="396057"/>
+            <a:ext cx="956749" cy="529695"/>
           </a:xfrm>
           <a:prstGeom prst="rect">
             <a:avLst/>
@@ -3675,8 +3685,8 @@
         </p:nvSpPr>
         <p:spPr>
           <a:xfrm>
-            <a:off x="2007687" y="4371696"/>
-            <a:ext cx="1659773" cy="389246"/>
+            <a:off x="2464668" y="4371695"/>
+            <a:ext cx="747648" cy="560675"/>
           </a:xfrm>
           <a:prstGeom prst="rect">
             <a:avLst/>
@@ -3804,12 +3814,12 @@
         </p:nvCxnSpPr>
         <p:spPr>
           <a:xfrm rot="16200000" flipH="1">
-            <a:off x="2660745" y="4194866"/>
-            <a:ext cx="335837" cy="17822"/>
+            <a:off x="2661203" y="4194406"/>
+            <a:ext cx="335838" cy="18739"/>
           </a:xfrm>
           <a:prstGeom prst="bentConnector3">
             <a:avLst>
-              <a:gd name="adj1" fmla="val 100326"/>
+              <a:gd name="adj1" fmla="val 50000"/>
             </a:avLst>
           </a:prstGeom>
           <a:ln w="12700">
@@ -4708,270 +4718,296 @@
           </a:fontRef>
         </p:style>
       </p:cxnSp>
-      <p:pic>
-        <p:nvPicPr>
-          <p:cNvPr id="8" name="Imagen 7"/>
-          <p:cNvPicPr>
-            <a:picLocks noChangeAspect="1"/>
-          </p:cNvPicPr>
-          <p:nvPr/>
-        </p:nvPicPr>
-        <p:blipFill>
-          <a:blip r:embed="rId2" cstate="print">
-            <a:extLst>
-              <a:ext uri="{28A0092B-C50C-407E-A947-70E740481C1C}">
-                <a14:useLocalDpi xmlns:a14="http://schemas.microsoft.com/office/drawing/2010/main" val="0"/>
-              </a:ext>
-            </a:extLst>
-          </a:blip>
-          <a:stretch>
-            <a:fillRect/>
-          </a:stretch>
-        </p:blipFill>
-        <p:spPr>
-          <a:xfrm>
-            <a:off x="3642146" y="6242162"/>
-            <a:ext cx="2151392" cy="122532"/>
+      <p:sp>
+        <p:nvSpPr>
+          <p:cNvPr id="9" name="CuadroTexto 8"/>
+          <p:cNvSpPr txBox="1"/>
+          <p:nvPr/>
+        </p:nvSpPr>
+        <p:spPr>
+          <a:xfrm>
+            <a:off x="1200351" y="4942048"/>
+            <a:ext cx="1264317" cy="276999"/>
           </a:xfrm>
           <a:prstGeom prst="rect">
             <a:avLst/>
           </a:prstGeom>
-        </p:spPr>
-      </p:pic>
-      <p:pic>
-        <p:nvPicPr>
-          <p:cNvPr id="11" name="Imagen 10"/>
-          <p:cNvPicPr>
-            <a:picLocks noChangeAspect="1"/>
-          </p:cNvPicPr>
-          <p:nvPr/>
-        </p:nvPicPr>
-        <p:blipFill>
-          <a:blip r:embed="rId3" cstate="print">
-            <a:extLst>
-              <a:ext uri="{28A0092B-C50C-407E-A947-70E740481C1C}">
-                <a14:useLocalDpi xmlns:a14="http://schemas.microsoft.com/office/drawing/2010/main" val="0"/>
-              </a:ext>
-            </a:extLst>
-          </a:blip>
-          <a:stretch>
-            <a:fillRect/>
-          </a:stretch>
-        </p:blipFill>
-        <p:spPr>
-          <a:xfrm>
-            <a:off x="1289398" y="5022330"/>
-            <a:ext cx="1122656" cy="125486"/>
+          <a:noFill/>
+        </p:spPr>
+        <p:txBody>
+          <a:bodyPr wrap="square" rtlCol="0">
+            <a:spAutoFit/>
+          </a:bodyPr>
+          <a:lstStyle/>
+          <a:p>
+            <a:r>
+              <a:rPr lang="es-CO" sz="1200" dirty="0" smtClean="0"/>
+              <a:t>MA_08_03_008</a:t>
+            </a:r>
+            <a:endParaRPr lang="es-CO" dirty="0"/>
+          </a:p>
+        </p:txBody>
+      </p:sp>
+      <p:sp>
+        <p:nvSpPr>
+          <p:cNvPr id="103" name="CuadroTexto 102"/>
+          <p:cNvSpPr txBox="1"/>
+          <p:nvPr/>
+        </p:nvSpPr>
+        <p:spPr>
+          <a:xfrm>
+            <a:off x="77385" y="4439832"/>
+            <a:ext cx="1962535" cy="553998"/>
           </a:xfrm>
           <a:prstGeom prst="rect">
             <a:avLst/>
           </a:prstGeom>
-        </p:spPr>
-      </p:pic>
-      <p:pic>
-        <p:nvPicPr>
-          <p:cNvPr id="21" name="Imagen 20"/>
-          <p:cNvPicPr>
-            <a:picLocks noChangeAspect="1"/>
-          </p:cNvPicPr>
-          <p:nvPr/>
-        </p:nvPicPr>
-        <p:blipFill>
-          <a:blip r:embed="rId4" cstate="print">
-            <a:extLst>
-              <a:ext uri="{28A0092B-C50C-407E-A947-70E740481C1C}">
-                <a14:useLocalDpi xmlns:a14="http://schemas.microsoft.com/office/drawing/2010/main" val="0"/>
-              </a:ext>
-            </a:extLst>
-          </a:blip>
-          <a:stretch>
-            <a:fillRect/>
-          </a:stretch>
-        </p:blipFill>
-        <p:spPr>
-          <a:xfrm>
-            <a:off x="215450" y="4471055"/>
-            <a:ext cx="1112385" cy="301466"/>
+          <a:noFill/>
+        </p:spPr>
+        <p:txBody>
+          <a:bodyPr wrap="square" rtlCol="0">
+            <a:spAutoFit/>
+          </a:bodyPr>
+          <a:lstStyle/>
+          <a:p>
+            <a:r>
+              <a:rPr lang="es-CO" sz="1200" dirty="0" smtClean="0"/>
+              <a:t>MA_08_03_006</a:t>
+            </a:r>
+          </a:p>
+          <a:p>
+            <a:r>
+              <a:rPr lang="es-CO" sz="1200" dirty="0" smtClean="0"/>
+              <a:t>MA_08_03_007</a:t>
+            </a:r>
+            <a:r>
+              <a:rPr lang="es-CO" dirty="0" smtClean="0"/>
+              <a:t> </a:t>
+            </a:r>
+            <a:endParaRPr lang="es-CO" dirty="0"/>
+          </a:p>
+        </p:txBody>
+      </p:sp>
+      <p:sp>
+        <p:nvSpPr>
+          <p:cNvPr id="104" name="CuadroTexto 103"/>
+          <p:cNvSpPr txBox="1"/>
+          <p:nvPr/>
+        </p:nvSpPr>
+        <p:spPr>
+          <a:xfrm>
+            <a:off x="2276518" y="4385995"/>
+            <a:ext cx="1962535" cy="553998"/>
           </a:xfrm>
           <a:prstGeom prst="rect">
             <a:avLst/>
           </a:prstGeom>
-        </p:spPr>
-      </p:pic>
-      <p:pic>
-        <p:nvPicPr>
-          <p:cNvPr id="22" name="Imagen 21"/>
-          <p:cNvPicPr>
-            <a:picLocks noChangeAspect="1"/>
-          </p:cNvPicPr>
-          <p:nvPr/>
-        </p:nvPicPr>
-        <p:blipFill>
-          <a:blip r:embed="rId5" cstate="print">
-            <a:extLst>
-              <a:ext uri="{28A0092B-C50C-407E-A947-70E740481C1C}">
-                <a14:useLocalDpi xmlns:a14="http://schemas.microsoft.com/office/drawing/2010/main" val="0"/>
-              </a:ext>
-            </a:extLst>
-          </a:blip>
-          <a:stretch>
-            <a:fillRect/>
-          </a:stretch>
-        </p:blipFill>
-        <p:spPr>
-          <a:xfrm>
-            <a:off x="3154041" y="5320063"/>
-            <a:ext cx="1171920" cy="112346"/>
+          <a:noFill/>
+        </p:spPr>
+        <p:txBody>
+          <a:bodyPr wrap="square" rtlCol="0">
+            <a:spAutoFit/>
+          </a:bodyPr>
+          <a:lstStyle/>
+          <a:p>
+            <a:r>
+              <a:rPr lang="es-CO" sz="1200" dirty="0" smtClean="0"/>
+              <a:t>MA_08_03_009</a:t>
+            </a:r>
+          </a:p>
+          <a:p>
+            <a:r>
+              <a:rPr lang="es-CO" sz="1200" dirty="0" smtClean="0"/>
+              <a:t>MA_08_03_010</a:t>
+            </a:r>
+            <a:r>
+              <a:rPr lang="es-CO" dirty="0" smtClean="0"/>
+              <a:t> </a:t>
+            </a:r>
+            <a:endParaRPr lang="es-CO" dirty="0"/>
+          </a:p>
+        </p:txBody>
+      </p:sp>
+      <p:sp>
+        <p:nvSpPr>
+          <p:cNvPr id="105" name="CuadroTexto 104"/>
+          <p:cNvSpPr txBox="1"/>
+          <p:nvPr/>
+        </p:nvSpPr>
+        <p:spPr>
+          <a:xfrm>
+            <a:off x="3192263" y="5224654"/>
+            <a:ext cx="1264317" cy="276999"/>
           </a:xfrm>
           <a:prstGeom prst="rect">
             <a:avLst/>
           </a:prstGeom>
-        </p:spPr>
-      </p:pic>
-      <p:pic>
-        <p:nvPicPr>
-          <p:cNvPr id="3" name="Imagen 2"/>
-          <p:cNvPicPr>
-            <a:picLocks noChangeAspect="1"/>
-          </p:cNvPicPr>
-          <p:nvPr/>
-        </p:nvPicPr>
-        <p:blipFill>
-          <a:blip r:embed="rId6" cstate="print">
-            <a:extLst>
-              <a:ext uri="{28A0092B-C50C-407E-A947-70E740481C1C}">
-                <a14:useLocalDpi xmlns:a14="http://schemas.microsoft.com/office/drawing/2010/main" val="0"/>
-              </a:ext>
-            </a:extLst>
-          </a:blip>
-          <a:stretch>
-            <a:fillRect/>
-          </a:stretch>
-        </p:blipFill>
-        <p:spPr>
-          <a:xfrm>
-            <a:off x="6829081" y="3422920"/>
-            <a:ext cx="395444" cy="239663"/>
+          <a:noFill/>
+        </p:spPr>
+        <p:txBody>
+          <a:bodyPr wrap="square" rtlCol="0">
+            <a:spAutoFit/>
+          </a:bodyPr>
+          <a:lstStyle/>
+          <a:p>
+            <a:r>
+              <a:rPr lang="es-CO" sz="1200" dirty="0" smtClean="0"/>
+              <a:t>MA_08_03_011</a:t>
+            </a:r>
+            <a:endParaRPr lang="es-CO" dirty="0"/>
+          </a:p>
+        </p:txBody>
+      </p:sp>
+      <p:sp>
+        <p:nvSpPr>
+          <p:cNvPr id="106" name="CuadroTexto 105"/>
+          <p:cNvSpPr txBox="1"/>
+          <p:nvPr/>
+        </p:nvSpPr>
+        <p:spPr>
+          <a:xfrm>
+            <a:off x="3972848" y="6167991"/>
+            <a:ext cx="1264317" cy="276999"/>
           </a:xfrm>
           <a:prstGeom prst="rect">
             <a:avLst/>
           </a:prstGeom>
-        </p:spPr>
-      </p:pic>
-      <p:pic>
-        <p:nvPicPr>
-          <p:cNvPr id="5" name="Imagen 4"/>
-          <p:cNvPicPr>
-            <a:picLocks noChangeAspect="1"/>
-          </p:cNvPicPr>
-          <p:nvPr/>
-        </p:nvPicPr>
-        <p:blipFill>
-          <a:blip r:embed="rId7">
-            <a:extLst>
-              <a:ext uri="{28A0092B-C50C-407E-A947-70E740481C1C}">
-                <a14:useLocalDpi xmlns:a14="http://schemas.microsoft.com/office/drawing/2010/main" val="0"/>
-              </a:ext>
-            </a:extLst>
-          </a:blip>
-          <a:stretch>
-            <a:fillRect/>
-          </a:stretch>
-        </p:blipFill>
-        <p:spPr>
-          <a:xfrm>
-            <a:off x="7637265" y="3431788"/>
-            <a:ext cx="428413" cy="259644"/>
+          <a:noFill/>
+        </p:spPr>
+        <p:txBody>
+          <a:bodyPr wrap="square" rtlCol="0">
+            <a:spAutoFit/>
+          </a:bodyPr>
+          <a:lstStyle/>
+          <a:p>
+            <a:r>
+              <a:rPr lang="es-CO" sz="1200" dirty="0" smtClean="0"/>
+              <a:t>MA_08_03_012</a:t>
+            </a:r>
+            <a:endParaRPr lang="es-CO" dirty="0"/>
+          </a:p>
+        </p:txBody>
+      </p:sp>
+      <p:sp>
+        <p:nvSpPr>
+          <p:cNvPr id="107" name="CuadroTexto 106"/>
+          <p:cNvSpPr txBox="1"/>
+          <p:nvPr/>
+        </p:nvSpPr>
+        <p:spPr>
+          <a:xfrm>
+            <a:off x="5453334" y="2771960"/>
+            <a:ext cx="1264317" cy="276999"/>
           </a:xfrm>
           <a:prstGeom prst="rect">
             <a:avLst/>
           </a:prstGeom>
-        </p:spPr>
-      </p:pic>
-      <p:pic>
-        <p:nvPicPr>
-          <p:cNvPr id="6" name="Imagen 5"/>
-          <p:cNvPicPr>
-            <a:picLocks noChangeAspect="1"/>
-          </p:cNvPicPr>
-          <p:nvPr/>
-        </p:nvPicPr>
-        <p:blipFill>
-          <a:blip r:embed="rId8">
-            <a:extLst>
-              <a:ext uri="{28A0092B-C50C-407E-A947-70E740481C1C}">
-                <a14:useLocalDpi xmlns:a14="http://schemas.microsoft.com/office/drawing/2010/main" val="0"/>
-              </a:ext>
-            </a:extLst>
-          </a:blip>
-          <a:stretch>
-            <a:fillRect/>
-          </a:stretch>
-        </p:blipFill>
-        <p:spPr>
-          <a:xfrm>
-            <a:off x="8276184" y="3414750"/>
-            <a:ext cx="413803" cy="272836"/>
+          <a:noFill/>
+        </p:spPr>
+        <p:txBody>
+          <a:bodyPr wrap="square" rtlCol="0">
+            <a:spAutoFit/>
+          </a:bodyPr>
+          <a:lstStyle/>
+          <a:p>
+            <a:r>
+              <a:rPr lang="es-CO" sz="1200" dirty="0" smtClean="0"/>
+              <a:t>MA_08_03_013</a:t>
+            </a:r>
+            <a:endParaRPr lang="es-CO" dirty="0"/>
+          </a:p>
+        </p:txBody>
+      </p:sp>
+      <p:sp>
+        <p:nvSpPr>
+          <p:cNvPr id="108" name="CuadroTexto 107"/>
+          <p:cNvSpPr txBox="1"/>
+          <p:nvPr/>
+        </p:nvSpPr>
+        <p:spPr>
+          <a:xfrm>
+            <a:off x="6393357" y="3348717"/>
+            <a:ext cx="1264317" cy="276999"/>
           </a:xfrm>
           <a:prstGeom prst="rect">
             <a:avLst/>
           </a:prstGeom>
-        </p:spPr>
-      </p:pic>
-      <p:pic>
-        <p:nvPicPr>
-          <p:cNvPr id="7" name="Imagen 6"/>
-          <p:cNvPicPr>
-            <a:picLocks noChangeAspect="1"/>
-          </p:cNvPicPr>
-          <p:nvPr/>
-        </p:nvPicPr>
-        <p:blipFill>
-          <a:blip r:embed="rId9" cstate="print">
-            <a:extLst>
-              <a:ext uri="{28A0092B-C50C-407E-A947-70E740481C1C}">
-                <a14:useLocalDpi xmlns:a14="http://schemas.microsoft.com/office/drawing/2010/main" val="0"/>
-              </a:ext>
-            </a:extLst>
-          </a:blip>
-          <a:stretch>
-            <a:fillRect/>
-          </a:stretch>
-        </p:blipFill>
-        <p:spPr>
-          <a:xfrm>
-            <a:off x="5833627" y="2872177"/>
-            <a:ext cx="404896" cy="135890"/>
+          <a:noFill/>
+        </p:spPr>
+        <p:txBody>
+          <a:bodyPr wrap="square" rtlCol="0">
+            <a:spAutoFit/>
+          </a:bodyPr>
+          <a:lstStyle/>
+          <a:p>
+            <a:r>
+              <a:rPr lang="es-CO" sz="1200" dirty="0" smtClean="0"/>
+              <a:t>MA_08_03_014</a:t>
+            </a:r>
+            <a:endParaRPr lang="es-CO" dirty="0"/>
+          </a:p>
+        </p:txBody>
+      </p:sp>
+      <p:sp>
+        <p:nvSpPr>
+          <p:cNvPr id="109" name="CuadroTexto 108"/>
+          <p:cNvSpPr txBox="1"/>
+          <p:nvPr/>
+        </p:nvSpPr>
+        <p:spPr>
+          <a:xfrm>
+            <a:off x="7119337" y="3514081"/>
+            <a:ext cx="1264317" cy="276999"/>
           </a:xfrm>
           <a:prstGeom prst="rect">
             <a:avLst/>
           </a:prstGeom>
-        </p:spPr>
-      </p:pic>
-      <p:pic>
-        <p:nvPicPr>
-          <p:cNvPr id="2" name="Imagen 1"/>
-          <p:cNvPicPr>
-            <a:picLocks noChangeAspect="1"/>
-          </p:cNvPicPr>
-          <p:nvPr/>
-        </p:nvPicPr>
-        <p:blipFill>
-          <a:blip r:embed="rId10"/>
-          <a:stretch>
-            <a:fillRect/>
-          </a:stretch>
-        </p:blipFill>
-        <p:spPr>
-          <a:xfrm>
-            <a:off x="2010873" y="4389199"/>
-            <a:ext cx="1762125" cy="381000"/>
+          <a:noFill/>
+        </p:spPr>
+        <p:txBody>
+          <a:bodyPr wrap="square" rtlCol="0">
+            <a:spAutoFit/>
+          </a:bodyPr>
+          <a:lstStyle/>
+          <a:p>
+            <a:r>
+              <a:rPr lang="es-CO" sz="1200" dirty="0" smtClean="0"/>
+              <a:t>MA_08_03_015</a:t>
+            </a:r>
+            <a:endParaRPr lang="es-CO" dirty="0"/>
+          </a:p>
+        </p:txBody>
+      </p:sp>
+      <p:sp>
+        <p:nvSpPr>
+          <p:cNvPr id="110" name="CuadroTexto 109"/>
+          <p:cNvSpPr txBox="1"/>
+          <p:nvPr/>
+        </p:nvSpPr>
+        <p:spPr>
+          <a:xfrm>
+            <a:off x="8019021" y="3325966"/>
+            <a:ext cx="1264317" cy="276999"/>
           </a:xfrm>
           <a:prstGeom prst="rect">
             <a:avLst/>
           </a:prstGeom>
-        </p:spPr>
-      </p:pic>
+          <a:noFill/>
+        </p:spPr>
+        <p:txBody>
+          <a:bodyPr wrap="square" rtlCol="0">
+            <a:spAutoFit/>
+          </a:bodyPr>
+          <a:lstStyle/>
+          <a:p>
+            <a:r>
+              <a:rPr lang="es-CO" sz="1200" dirty="0" smtClean="0"/>
+              <a:t>MA_08_03_016</a:t>
+            </a:r>
+            <a:endParaRPr lang="es-CO" dirty="0"/>
+          </a:p>
+        </p:txBody>
+      </p:sp>
     </p:spTree>
     <p:extLst>
       <p:ext uri="{BB962C8B-B14F-4D97-AF65-F5344CB8AC3E}">

</xml_diff>

<commit_message>
Cambio en mapa conceptual y observaciones tema 3
Realizo cambio en el mapa conceptual.
Agrego archivo con comentarios de guía didáctica y cuaderno de estudio
tema 3 grado 8.
</commit_message>
<xml_diff>
--- a/fuentes/contenidos/grado08/guion03/MA_08_03_CO_REC310.pptx
+++ b/fuentes/contenidos/grado08/guion03/MA_08_03_CO_REC310.pptx
@@ -450,7 +450,7 @@
           <a:p>
             <a:fld id="{5001C876-01F7-4317-94B9-1AE222133113}" type="datetimeFigureOut">
               <a:rPr lang="es-ES" smtClean="0"/>
-              <a:t>04/11/2015</a:t>
+              <a:t>24/11/2015</a:t>
             </a:fld>
             <a:endParaRPr lang="es-ES" dirty="0"/>
           </a:p>
@@ -1599,17 +1599,7 @@
                 <a:latin typeface="Arial" panose="020B0604020202020204" pitchFamily="34" charset="0"/>
                 <a:cs typeface="Arial" panose="020B0604020202020204" pitchFamily="34" charset="0"/>
               </a:rPr>
-              <a:t> es un número </a:t>
-            </a:r>
-            <a:r>
-              <a:rPr lang="es-ES" sz="800" dirty="0" smtClean="0">
-                <a:solidFill>
-                  <a:schemeClr val="tx1"/>
-                </a:solidFill>
-                <a:latin typeface="Arial" panose="020B0604020202020204" pitchFamily="34" charset="0"/>
-                <a:cs typeface="Arial" panose="020B0604020202020204" pitchFamily="34" charset="0"/>
-              </a:rPr>
-              <a:t>par</a:t>
+              <a:t> es un número par</a:t>
             </a:r>
             <a:endParaRPr lang="es-ES" sz="800" dirty="0">
               <a:solidFill>
@@ -1690,17 +1680,7 @@
                 <a:latin typeface="Arial" panose="020B0604020202020204" pitchFamily="34" charset="0"/>
                 <a:cs typeface="Arial" panose="020B0604020202020204" pitchFamily="34" charset="0"/>
               </a:rPr>
-              <a:t> es un número </a:t>
-            </a:r>
-            <a:r>
-              <a:rPr lang="es-ES" sz="800" dirty="0" smtClean="0">
-                <a:solidFill>
-                  <a:schemeClr val="tx1"/>
-                </a:solidFill>
-                <a:latin typeface="Arial" panose="020B0604020202020204" pitchFamily="34" charset="0"/>
-                <a:cs typeface="Arial" panose="020B0604020202020204" pitchFamily="34" charset="0"/>
-              </a:rPr>
-              <a:t>impar</a:t>
+              <a:t> es un número impar</a:t>
             </a:r>
             <a:endParaRPr lang="es-ES" sz="900" dirty="0">
               <a:solidFill>
@@ -2661,138 +2641,6 @@
       </p:sp>
       <p:sp>
         <p:nvSpPr>
-          <p:cNvPr id="364" name="CuadroTexto 363" descr="Conector entre nodos" title="conector"/>
-          <p:cNvSpPr txBox="1"/>
-          <p:nvPr/>
-        </p:nvSpPr>
-        <p:spPr>
-          <a:xfrm>
-            <a:off x="5211239" y="3970778"/>
-            <a:ext cx="1572192" cy="215444"/>
-          </a:xfrm>
-          <a:prstGeom prst="rect">
-            <a:avLst/>
-          </a:prstGeom>
-          <a:noFill/>
-        </p:spPr>
-        <p:txBody>
-          <a:bodyPr wrap="square" rtlCol="0">
-            <a:spAutoFit/>
-          </a:bodyPr>
-          <a:lstStyle/>
-          <a:p>
-            <a:pPr algn="ctr"/>
-            <a:r>
-              <a:rPr lang="es-ES" sz="800" dirty="0" smtClean="0">
-                <a:latin typeface="Arial" panose="020B0604020202020204" pitchFamily="34" charset="0"/>
-                <a:cs typeface="Arial" panose="020B0604020202020204" pitchFamily="34" charset="0"/>
-              </a:rPr>
-              <a:t>algunas características son</a:t>
-            </a:r>
-            <a:endParaRPr lang="es-ES" sz="800" dirty="0">
-              <a:latin typeface="Arial" panose="020B0604020202020204" pitchFamily="34" charset="0"/>
-              <a:cs typeface="Arial" panose="020B0604020202020204" pitchFamily="34" charset="0"/>
-            </a:endParaRPr>
-          </a:p>
-        </p:txBody>
-      </p:sp>
-      <p:sp>
-        <p:nvSpPr>
-          <p:cNvPr id="365" name="Rectángulo 364" descr="Nodo de cuarto nivel&#10;" title="Nodo04"/>
-          <p:cNvSpPr/>
-          <p:nvPr/>
-        </p:nvSpPr>
-        <p:spPr>
-          <a:xfrm>
-            <a:off x="5388228" y="4449954"/>
-            <a:ext cx="1244491" cy="1562926"/>
-          </a:xfrm>
-          <a:prstGeom prst="rect">
-            <a:avLst/>
-          </a:prstGeom>
-          <a:noFill/>
-          <a:ln>
-            <a:solidFill>
-              <a:schemeClr val="tx1"/>
-            </a:solidFill>
-          </a:ln>
-        </p:spPr>
-        <p:style>
-          <a:lnRef idx="2">
-            <a:schemeClr val="accent6"/>
-          </a:lnRef>
-          <a:fillRef idx="1">
-            <a:schemeClr val="lt1"/>
-          </a:fillRef>
-          <a:effectRef idx="0">
-            <a:schemeClr val="accent6"/>
-          </a:effectRef>
-          <a:fontRef idx="minor">
-            <a:schemeClr val="dk1"/>
-          </a:fontRef>
-        </p:style>
-        <p:txBody>
-          <a:bodyPr rtlCol="0" anchor="ctr"/>
-          <a:lstStyle/>
-          <a:p>
-            <a:pPr marL="171450" indent="-171450">
-              <a:buFont typeface="Arial" panose="020B0604020202020204" pitchFamily="34" charset="0"/>
-              <a:buChar char="•"/>
-            </a:pPr>
-            <a:r>
-              <a:rPr lang="es-ES" sz="800" dirty="0" smtClean="0">
-                <a:solidFill>
-                  <a:schemeClr val="tx1"/>
-                </a:solidFill>
-                <a:latin typeface="Arial" panose="020B0604020202020204" pitchFamily="34" charset="0"/>
-                <a:cs typeface="Arial" panose="020B0604020202020204" pitchFamily="34" charset="0"/>
-              </a:rPr>
-              <a:t>cada término es la suma de los dos términos de la fila anterior.</a:t>
-            </a:r>
-          </a:p>
-          <a:p>
-            <a:pPr marL="171450" indent="-171450">
-              <a:buFont typeface="Arial" panose="020B0604020202020204" pitchFamily="34" charset="0"/>
-              <a:buChar char="•"/>
-            </a:pPr>
-            <a:r>
-              <a:rPr lang="es-ES" sz="800" dirty="0" smtClean="0">
-                <a:solidFill>
-                  <a:schemeClr val="tx1"/>
-                </a:solidFill>
-                <a:latin typeface="Arial" panose="020B0604020202020204" pitchFamily="34" charset="0"/>
-                <a:cs typeface="Arial" panose="020B0604020202020204" pitchFamily="34" charset="0"/>
-              </a:rPr>
-              <a:t>si es la potencia de una adición todos los signos son positivos.</a:t>
-            </a:r>
-          </a:p>
-          <a:p>
-            <a:pPr marL="171450" indent="-171450">
-              <a:buFont typeface="Arial" panose="020B0604020202020204" pitchFamily="34" charset="0"/>
-              <a:buChar char="•"/>
-            </a:pPr>
-            <a:r>
-              <a:rPr lang="es-ES" sz="800" dirty="0" smtClean="0">
-                <a:solidFill>
-                  <a:schemeClr val="tx1"/>
-                </a:solidFill>
-                <a:latin typeface="Arial" panose="020B0604020202020204" pitchFamily="34" charset="0"/>
-                <a:cs typeface="Arial" panose="020B0604020202020204" pitchFamily="34" charset="0"/>
-              </a:rPr>
-              <a:t>si es la potencia de una sustracción los signos van intercalados.</a:t>
-            </a:r>
-            <a:endParaRPr lang="es-ES" sz="800" dirty="0">
-              <a:solidFill>
-                <a:schemeClr val="tx1"/>
-              </a:solidFill>
-              <a:latin typeface="Arial" panose="020B0604020202020204" pitchFamily="34" charset="0"/>
-              <a:cs typeface="Arial" panose="020B0604020202020204" pitchFamily="34" charset="0"/>
-            </a:endParaRPr>
-          </a:p>
-        </p:txBody>
-      </p:sp>
-      <p:sp>
-        <p:nvSpPr>
           <p:cNvPr id="366" name="Rectángulo 365" descr="Nodo de primer nivel" title="Nodo01"/>
           <p:cNvSpPr/>
           <p:nvPr/>
@@ -4255,84 +4103,6 @@
           <a:prstGeom prst="bentConnector3">
             <a:avLst>
               <a:gd name="adj1" fmla="val 105070"/>
-            </a:avLst>
-          </a:prstGeom>
-          <a:ln w="12700">
-            <a:solidFill>
-              <a:schemeClr val="tx1"/>
-            </a:solidFill>
-          </a:ln>
-        </p:spPr>
-        <p:style>
-          <a:lnRef idx="1">
-            <a:schemeClr val="accent1"/>
-          </a:lnRef>
-          <a:fillRef idx="0">
-            <a:schemeClr val="accent1"/>
-          </a:fillRef>
-          <a:effectRef idx="0">
-            <a:schemeClr val="accent1"/>
-          </a:effectRef>
-          <a:fontRef idx="minor">
-            <a:schemeClr val="tx1"/>
-          </a:fontRef>
-        </p:style>
-      </p:cxnSp>
-      <p:cxnSp>
-        <p:nvCxnSpPr>
-          <p:cNvPr id="351" name="Conector angular 350"/>
-          <p:cNvCxnSpPr>
-            <a:stCxn id="363" idx="2"/>
-          </p:cNvCxnSpPr>
-          <p:nvPr/>
-        </p:nvCxnSpPr>
-        <p:spPr>
-          <a:xfrm rot="16200000" flipH="1">
-            <a:off x="5928334" y="3956600"/>
-            <a:ext cx="154094" cy="334"/>
-          </a:xfrm>
-          <a:prstGeom prst="bentConnector3">
-            <a:avLst>
-              <a:gd name="adj1" fmla="val 50000"/>
-            </a:avLst>
-          </a:prstGeom>
-          <a:ln w="12700">
-            <a:solidFill>
-              <a:schemeClr val="tx1"/>
-            </a:solidFill>
-          </a:ln>
-        </p:spPr>
-        <p:style>
-          <a:lnRef idx="1">
-            <a:schemeClr val="accent1"/>
-          </a:lnRef>
-          <a:fillRef idx="0">
-            <a:schemeClr val="accent1"/>
-          </a:fillRef>
-          <a:effectRef idx="0">
-            <a:schemeClr val="accent1"/>
-          </a:effectRef>
-          <a:fontRef idx="minor">
-            <a:schemeClr val="tx1"/>
-          </a:fontRef>
-        </p:style>
-      </p:cxnSp>
-      <p:cxnSp>
-        <p:nvCxnSpPr>
-          <p:cNvPr id="352" name="Conector angular 351"/>
-          <p:cNvCxnSpPr>
-            <a:endCxn id="365" idx="0"/>
-          </p:cNvCxnSpPr>
-          <p:nvPr/>
-        </p:nvCxnSpPr>
-        <p:spPr>
-          <a:xfrm rot="5400000">
-            <a:off x="5886513" y="4310184"/>
-            <a:ext cx="263731" cy="15808"/>
-          </a:xfrm>
-          <a:prstGeom prst="bentConnector3">
-            <a:avLst>
-              <a:gd name="adj1" fmla="val -2121"/>
             </a:avLst>
           </a:prstGeom>
           <a:ln w="12700">

</xml_diff>

<commit_message>
Inserto fórmulas en mapa conceptual
</commit_message>
<xml_diff>
--- a/fuentes/contenidos/grado08/guion03/MA_08_03_CO_REC310.pptx
+++ b/fuentes/contenidos/grado08/guion03/MA_08_03_CO_REC310.pptx
@@ -450,7 +450,7 @@
           <a:p>
             <a:fld id="{5001C876-01F7-4317-94B9-1AE222133113}" type="datetimeFigureOut">
               <a:rPr lang="es-ES" smtClean="0"/>
-              <a:t>24/11/2015</a:t>
+              <a:t>25/11/2015</a:t>
             </a:fld>
             <a:endParaRPr lang="es-ES" dirty="0"/>
           </a:p>
@@ -1193,8 +1193,8 @@
         </p:nvSpPr>
         <p:spPr>
           <a:xfrm>
-            <a:off x="6783431" y="3366768"/>
-            <a:ext cx="441094" cy="343441"/>
+            <a:off x="6675457" y="3199306"/>
+            <a:ext cx="549068" cy="510903"/>
           </a:xfrm>
           <a:prstGeom prst="rect">
             <a:avLst/>
@@ -1247,7 +1247,7 @@
         </p:nvSpPr>
         <p:spPr>
           <a:xfrm>
-            <a:off x="6717651" y="4055860"/>
+            <a:off x="6552428" y="4033553"/>
             <a:ext cx="841529" cy="534222"/>
           </a:xfrm>
           <a:prstGeom prst="rect">
@@ -1321,8 +1321,8 @@
         </p:nvCxnSpPr>
         <p:spPr>
           <a:xfrm rot="5400000">
-            <a:off x="7116768" y="2578709"/>
-            <a:ext cx="675270" cy="900849"/>
+            <a:off x="7173505" y="2467984"/>
+            <a:ext cx="507808" cy="954836"/>
           </a:xfrm>
           <a:prstGeom prst="bentConnector3">
             <a:avLst>
@@ -1432,8 +1432,8 @@
         </p:nvSpPr>
         <p:spPr>
           <a:xfrm>
-            <a:off x="7582509" y="3386059"/>
-            <a:ext cx="494822" cy="343441"/>
+            <a:off x="7430113" y="3227097"/>
+            <a:ext cx="647218" cy="502404"/>
           </a:xfrm>
           <a:prstGeom prst="rect">
             <a:avLst/>
@@ -1486,8 +1486,8 @@
         </p:nvSpPr>
         <p:spPr>
           <a:xfrm>
-            <a:off x="8224609" y="3373361"/>
-            <a:ext cx="515656" cy="343441"/>
+            <a:off x="8224609" y="3199307"/>
+            <a:ext cx="654262" cy="517496"/>
           </a:xfrm>
           <a:prstGeom prst="rect">
             <a:avLst/>
@@ -1735,12 +1735,12 @@
         </p:nvCxnSpPr>
         <p:spPr>
           <a:xfrm rot="5400000">
-            <a:off x="7712003" y="3202377"/>
-            <a:ext cx="367025" cy="18622"/>
+            <a:off x="7658497" y="3164187"/>
+            <a:ext cx="458722" cy="3305"/>
           </a:xfrm>
           <a:prstGeom prst="bentConnector3">
             <a:avLst>
-              <a:gd name="adj1" fmla="val 94202"/>
+              <a:gd name="adj1" fmla="val 50000"/>
             </a:avLst>
           </a:prstGeom>
           <a:ln w="12700">
@@ -1767,18 +1767,18 @@
       <p:cxnSp>
         <p:nvCxnSpPr>
           <p:cNvPr id="389" name="Conector angular 388"/>
-          <p:cNvCxnSpPr/>
+          <p:cNvCxnSpPr>
+            <a:endCxn id="370" idx="0"/>
+          </p:cNvCxnSpPr>
           <p:nvPr/>
         </p:nvCxnSpPr>
         <p:spPr>
           <a:xfrm>
             <a:off x="7900308" y="3034939"/>
-            <a:ext cx="655129" cy="338422"/>
-          </a:xfrm>
-          <a:prstGeom prst="bentConnector3">
-            <a:avLst>
-              <a:gd name="adj1" fmla="val 84252"/>
-            </a:avLst>
+            <a:ext cx="651432" cy="164368"/>
+          </a:xfrm>
+          <a:prstGeom prst="bentConnector2">
+            <a:avLst/>
           </a:prstGeom>
           <a:ln w="12700">
             <a:solidFill>
@@ -1809,7 +1809,7 @@
         </p:nvSpPr>
         <p:spPr>
           <a:xfrm>
-            <a:off x="479273" y="3090200"/>
+            <a:off x="259977" y="3102090"/>
             <a:ext cx="858018" cy="508918"/>
           </a:xfrm>
           <a:prstGeom prst="rect">
@@ -1876,7 +1876,7 @@
         </p:nvSpPr>
         <p:spPr>
           <a:xfrm>
-            <a:off x="4408475" y="3936065"/>
+            <a:off x="4314490" y="3368437"/>
             <a:ext cx="871185" cy="459356"/>
           </a:xfrm>
           <a:prstGeom prst="rect">
@@ -1940,7 +1940,7 @@
         </p:nvSpPr>
         <p:spPr>
           <a:xfrm>
-            <a:off x="1458395" y="3389708"/>
+            <a:off x="1306989" y="3287764"/>
             <a:ext cx="816526" cy="540029"/>
           </a:xfrm>
           <a:prstGeom prst="rect">
@@ -1997,7 +1997,7 @@
         </p:nvSpPr>
         <p:spPr>
           <a:xfrm>
-            <a:off x="3420427" y="3129259"/>
+            <a:off x="3212164" y="3267015"/>
             <a:ext cx="962099" cy="605225"/>
           </a:xfrm>
           <a:prstGeom prst="rect">
@@ -2077,7 +2077,7 @@
         </p:nvSpPr>
         <p:spPr>
           <a:xfrm>
-            <a:off x="2403160" y="3045137"/>
+            <a:off x="2252640" y="3277315"/>
             <a:ext cx="789103" cy="550478"/>
           </a:xfrm>
           <a:prstGeom prst="rect">
@@ -2888,11 +2888,11 @@
         <p:spPr>
           <a:xfrm>
             <a:off x="711360" y="2822665"/>
-            <a:ext cx="4159026" cy="16743"/>
+            <a:ext cx="4003368" cy="15822"/>
           </a:xfrm>
           <a:prstGeom prst="bentConnector3">
             <a:avLst>
-              <a:gd name="adj1" fmla="val 297"/>
+              <a:gd name="adj1" fmla="val 50000"/>
             </a:avLst>
           </a:prstGeom>
           <a:ln w="12700">
@@ -2956,17 +2956,19 @@
       <p:cxnSp>
         <p:nvCxnSpPr>
           <p:cNvPr id="158" name="Conector angular 157"/>
-          <p:cNvCxnSpPr/>
+          <p:cNvCxnSpPr>
+            <a:endCxn id="533" idx="0"/>
+          </p:cNvCxnSpPr>
           <p:nvPr/>
         </p:nvCxnSpPr>
         <p:spPr>
-          <a:xfrm rot="5400000">
-            <a:off x="1574436" y="3103928"/>
-            <a:ext cx="528789" cy="10078"/>
+          <a:xfrm rot="16200000" flipH="1">
+            <a:off x="1500147" y="3072659"/>
+            <a:ext cx="415900" cy="14309"/>
           </a:xfrm>
           <a:prstGeom prst="bentConnector3">
             <a:avLst>
-              <a:gd name="adj1" fmla="val 101631"/>
+              <a:gd name="adj1" fmla="val 50000"/>
             </a:avLst>
           </a:prstGeom>
           <a:ln w="12700">
@@ -2993,17 +2995,19 @@
       <p:cxnSp>
         <p:nvCxnSpPr>
           <p:cNvPr id="159" name="Conector angular 158"/>
-          <p:cNvCxnSpPr/>
+          <p:cNvCxnSpPr>
+            <a:endCxn id="535" idx="0"/>
+          </p:cNvCxnSpPr>
           <p:nvPr/>
         </p:nvCxnSpPr>
         <p:spPr>
-          <a:xfrm rot="16200000" flipH="1">
-            <a:off x="2695896" y="2930353"/>
-            <a:ext cx="216328" cy="27424"/>
+          <a:xfrm rot="5400000">
+            <a:off x="2464338" y="3077659"/>
+            <a:ext cx="382511" cy="16801"/>
           </a:xfrm>
           <a:prstGeom prst="bentConnector3">
             <a:avLst>
-              <a:gd name="adj1" fmla="val 2277"/>
+              <a:gd name="adj1" fmla="val 50000"/>
             </a:avLst>
           </a:prstGeom>
           <a:ln w="12700">
@@ -3030,17 +3034,19 @@
       <p:cxnSp>
         <p:nvCxnSpPr>
           <p:cNvPr id="160" name="Conector angular 159"/>
-          <p:cNvCxnSpPr/>
+          <p:cNvCxnSpPr>
+            <a:endCxn id="534" idx="0"/>
+          </p:cNvCxnSpPr>
           <p:nvPr/>
         </p:nvCxnSpPr>
         <p:spPr>
           <a:xfrm rot="16200000" flipH="1">
-            <a:off x="3753018" y="2953757"/>
-            <a:ext cx="287329" cy="21306"/>
+            <a:off x="3483139" y="3056939"/>
+            <a:ext cx="420149" cy="1"/>
           </a:xfrm>
           <a:prstGeom prst="bentConnector3">
             <a:avLst>
-              <a:gd name="adj1" fmla="val 4946"/>
+              <a:gd name="adj1" fmla="val 50000"/>
             </a:avLst>
           </a:prstGeom>
           <a:ln w="12700">
@@ -3067,50 +3073,15 @@
       <p:cxnSp>
         <p:nvCxnSpPr>
           <p:cNvPr id="161" name="Conector angular 160"/>
-          <p:cNvCxnSpPr/>
+          <p:cNvCxnSpPr>
+            <a:endCxn id="532" idx="0"/>
+          </p:cNvCxnSpPr>
           <p:nvPr/>
         </p:nvCxnSpPr>
         <p:spPr>
-          <a:xfrm rot="5400000">
-            <a:off x="4332507" y="3382353"/>
-            <a:ext cx="1091721" cy="3047"/>
-          </a:xfrm>
-          <a:prstGeom prst="bentConnector3">
-            <a:avLst>
-              <a:gd name="adj1" fmla="val -543"/>
-            </a:avLst>
-          </a:prstGeom>
-          <a:ln w="12700">
-            <a:solidFill>
-              <a:schemeClr val="tx1"/>
-            </a:solidFill>
-          </a:ln>
-        </p:spPr>
-        <p:style>
-          <a:lnRef idx="1">
-            <a:schemeClr val="accent1"/>
-          </a:lnRef>
-          <a:fillRef idx="0">
-            <a:schemeClr val="accent1"/>
-          </a:fillRef>
-          <a:effectRef idx="0">
-            <a:schemeClr val="accent1"/>
-          </a:effectRef>
-          <a:fontRef idx="minor">
-            <a:schemeClr val="tx1"/>
-          </a:fontRef>
-        </p:style>
-      </p:cxnSp>
-      <p:cxnSp>
-        <p:nvCxnSpPr>
-          <p:cNvPr id="178" name="Conector angular 177"/>
-          <p:cNvCxnSpPr/>
-          <p:nvPr/>
-        </p:nvCxnSpPr>
-        <p:spPr>
           <a:xfrm rot="16200000" flipH="1">
-            <a:off x="495093" y="3854539"/>
-            <a:ext cx="486607" cy="4266"/>
+            <a:off x="4475471" y="3093824"/>
+            <a:ext cx="521573" cy="27651"/>
           </a:xfrm>
           <a:prstGeom prst="bentConnector3">
             <a:avLst>
@@ -3277,668 +3248,6 @@
           </a:fontRef>
         </p:style>
       </p:cxnSp>
-      <p:sp>
-        <p:nvSpPr>
-          <p:cNvPr id="243" name="CuadroTexto 242" descr="Conector entre nodos" title="conector"/>
-          <p:cNvSpPr txBox="1"/>
-          <p:nvPr/>
-        </p:nvSpPr>
-        <p:spPr>
-          <a:xfrm>
-            <a:off x="278333" y="4072014"/>
-            <a:ext cx="1115559" cy="215444"/>
-          </a:xfrm>
-          <a:prstGeom prst="rect">
-            <a:avLst/>
-          </a:prstGeom>
-          <a:noFill/>
-        </p:spPr>
-        <p:txBody>
-          <a:bodyPr wrap="square" rtlCol="0">
-            <a:spAutoFit/>
-          </a:bodyPr>
-          <a:lstStyle/>
-          <a:p>
-            <a:pPr algn="ctr"/>
-            <a:r>
-              <a:rPr lang="es-ES" sz="800" dirty="0" smtClean="0">
-                <a:latin typeface="Arial" panose="020B0604020202020204" pitchFamily="34" charset="0"/>
-                <a:cs typeface="Arial" panose="020B0604020202020204" pitchFamily="34" charset="0"/>
-              </a:rPr>
-              <a:t>su generalización es</a:t>
-            </a:r>
-            <a:endParaRPr lang="es-ES" sz="800" dirty="0">
-              <a:latin typeface="Arial" panose="020B0604020202020204" pitchFamily="34" charset="0"/>
-              <a:cs typeface="Arial" panose="020B0604020202020204" pitchFamily="34" charset="0"/>
-            </a:endParaRPr>
-          </a:p>
-        </p:txBody>
-      </p:sp>
-      <p:sp>
-        <p:nvSpPr>
-          <p:cNvPr id="244" name="CuadroTexto 243" descr="Conector entre nodos" title="conector"/>
-          <p:cNvSpPr txBox="1"/>
-          <p:nvPr/>
-        </p:nvSpPr>
-        <p:spPr>
-          <a:xfrm>
-            <a:off x="1382417" y="4077341"/>
-            <a:ext cx="838459" cy="215444"/>
-          </a:xfrm>
-          <a:prstGeom prst="rect">
-            <a:avLst/>
-          </a:prstGeom>
-          <a:noFill/>
-        </p:spPr>
-        <p:txBody>
-          <a:bodyPr wrap="square" rtlCol="0">
-            <a:spAutoFit/>
-          </a:bodyPr>
-          <a:lstStyle/>
-          <a:p>
-            <a:pPr algn="ctr"/>
-            <a:r>
-              <a:rPr lang="es-ES" sz="800" dirty="0" smtClean="0">
-                <a:latin typeface="Arial" panose="020B0604020202020204" pitchFamily="34" charset="0"/>
-                <a:cs typeface="Arial" panose="020B0604020202020204" pitchFamily="34" charset="0"/>
-              </a:rPr>
-              <a:t>por ejemplo</a:t>
-            </a:r>
-            <a:endParaRPr lang="es-ES" sz="800" dirty="0">
-              <a:latin typeface="Arial" panose="020B0604020202020204" pitchFamily="34" charset="0"/>
-              <a:cs typeface="Arial" panose="020B0604020202020204" pitchFamily="34" charset="0"/>
-            </a:endParaRPr>
-          </a:p>
-        </p:txBody>
-      </p:sp>
-      <p:sp>
-        <p:nvSpPr>
-          <p:cNvPr id="245" name="CuadroTexto 244" descr="Conector entre nodos" title="conector"/>
-          <p:cNvSpPr txBox="1"/>
-          <p:nvPr/>
-        </p:nvSpPr>
-        <p:spPr>
-          <a:xfrm>
-            <a:off x="3427964" y="4820120"/>
-            <a:ext cx="838459" cy="215444"/>
-          </a:xfrm>
-          <a:prstGeom prst="rect">
-            <a:avLst/>
-          </a:prstGeom>
-          <a:noFill/>
-        </p:spPr>
-        <p:txBody>
-          <a:bodyPr wrap="square" rtlCol="0">
-            <a:spAutoFit/>
-          </a:bodyPr>
-          <a:lstStyle/>
-          <a:p>
-            <a:pPr algn="ctr"/>
-            <a:r>
-              <a:rPr lang="es-ES" sz="800" dirty="0" smtClean="0">
-                <a:latin typeface="Arial" panose="020B0604020202020204" pitchFamily="34" charset="0"/>
-                <a:cs typeface="Arial" panose="020B0604020202020204" pitchFamily="34" charset="0"/>
-              </a:rPr>
-              <a:t>por ejemplo</a:t>
-            </a:r>
-            <a:endParaRPr lang="es-ES" sz="800" dirty="0">
-              <a:latin typeface="Arial" panose="020B0604020202020204" pitchFamily="34" charset="0"/>
-              <a:cs typeface="Arial" panose="020B0604020202020204" pitchFamily="34" charset="0"/>
-            </a:endParaRPr>
-          </a:p>
-        </p:txBody>
-      </p:sp>
-      <p:sp>
-        <p:nvSpPr>
-          <p:cNvPr id="246" name="CuadroTexto 245" descr="Conector entre nodos" title="conector"/>
-          <p:cNvSpPr txBox="1"/>
-          <p:nvPr/>
-        </p:nvSpPr>
-        <p:spPr>
-          <a:xfrm>
-            <a:off x="4256111" y="4546503"/>
-            <a:ext cx="981054" cy="215444"/>
-          </a:xfrm>
-          <a:prstGeom prst="rect">
-            <a:avLst/>
-          </a:prstGeom>
-          <a:noFill/>
-        </p:spPr>
-        <p:txBody>
-          <a:bodyPr wrap="square" rtlCol="0">
-            <a:spAutoFit/>
-          </a:bodyPr>
-          <a:lstStyle/>
-          <a:p>
-            <a:pPr algn="ctr"/>
-            <a:r>
-              <a:rPr lang="es-ES" sz="800" dirty="0" smtClean="0">
-                <a:latin typeface="Arial" panose="020B0604020202020204" pitchFamily="34" charset="0"/>
-                <a:cs typeface="Arial" panose="020B0604020202020204" pitchFamily="34" charset="0"/>
-              </a:rPr>
-              <a:t>se expresa como</a:t>
-            </a:r>
-            <a:endParaRPr lang="es-ES" sz="800" dirty="0">
-              <a:latin typeface="Arial" panose="020B0604020202020204" pitchFamily="34" charset="0"/>
-              <a:cs typeface="Arial" panose="020B0604020202020204" pitchFamily="34" charset="0"/>
-            </a:endParaRPr>
-          </a:p>
-        </p:txBody>
-      </p:sp>
-      <p:sp>
-        <p:nvSpPr>
-          <p:cNvPr id="253" name="Rectángulo 252" descr="Nodo de cuarto nivel&#10;" title="Nodo04"/>
-          <p:cNvSpPr/>
-          <p:nvPr/>
-        </p:nvSpPr>
-        <p:spPr>
-          <a:xfrm>
-            <a:off x="141774" y="4421096"/>
-            <a:ext cx="956749" cy="529695"/>
-          </a:xfrm>
-          <a:prstGeom prst="rect">
-            <a:avLst/>
-          </a:prstGeom>
-          <a:noFill/>
-          <a:ln>
-            <a:solidFill>
-              <a:schemeClr val="tx1"/>
-            </a:solidFill>
-          </a:ln>
-        </p:spPr>
-        <p:style>
-          <a:lnRef idx="2">
-            <a:schemeClr val="accent6"/>
-          </a:lnRef>
-          <a:fillRef idx="1">
-            <a:schemeClr val="lt1"/>
-          </a:fillRef>
-          <a:effectRef idx="0">
-            <a:schemeClr val="accent6"/>
-          </a:effectRef>
-          <a:fontRef idx="minor">
-            <a:schemeClr val="dk1"/>
-          </a:fontRef>
-        </p:style>
-        <p:txBody>
-          <a:bodyPr rtlCol="0" anchor="ctr"/>
-          <a:lstStyle/>
-          <a:p>
-            <a:pPr algn="ctr"/>
-            <a:endParaRPr lang="es-ES" sz="800" baseline="30000" dirty="0">
-              <a:solidFill>
-                <a:schemeClr val="tx1"/>
-              </a:solidFill>
-              <a:latin typeface="Arial" panose="020B0604020202020204" pitchFamily="34" charset="0"/>
-              <a:cs typeface="Arial" panose="020B0604020202020204" pitchFamily="34" charset="0"/>
-            </a:endParaRPr>
-          </a:p>
-        </p:txBody>
-      </p:sp>
-      <p:sp>
-        <p:nvSpPr>
-          <p:cNvPr id="254" name="Rectángulo 253" descr="Nodo de cuarto nivel&#10;" title="Nodo04"/>
-          <p:cNvSpPr/>
-          <p:nvPr/>
-        </p:nvSpPr>
-        <p:spPr>
-          <a:xfrm>
-            <a:off x="1210075" y="4950791"/>
-            <a:ext cx="1240982" cy="284116"/>
-          </a:xfrm>
-          <a:prstGeom prst="rect">
-            <a:avLst/>
-          </a:prstGeom>
-          <a:noFill/>
-          <a:ln>
-            <a:solidFill>
-              <a:schemeClr val="tx1"/>
-            </a:solidFill>
-          </a:ln>
-        </p:spPr>
-        <p:style>
-          <a:lnRef idx="2">
-            <a:schemeClr val="accent6"/>
-          </a:lnRef>
-          <a:fillRef idx="1">
-            <a:schemeClr val="lt1"/>
-          </a:fillRef>
-          <a:effectRef idx="0">
-            <a:schemeClr val="accent6"/>
-          </a:effectRef>
-          <a:fontRef idx="minor">
-            <a:schemeClr val="dk1"/>
-          </a:fontRef>
-        </p:style>
-        <p:txBody>
-          <a:bodyPr rtlCol="0" anchor="ctr"/>
-          <a:lstStyle/>
-          <a:p>
-            <a:pPr algn="ctr"/>
-            <a:endParaRPr lang="es-ES" sz="800" baseline="30000" dirty="0">
-              <a:solidFill>
-                <a:schemeClr val="tx1"/>
-              </a:solidFill>
-              <a:latin typeface="Arial" panose="020B0604020202020204" pitchFamily="34" charset="0"/>
-              <a:cs typeface="Arial" panose="020B0604020202020204" pitchFamily="34" charset="0"/>
-            </a:endParaRPr>
-          </a:p>
-        </p:txBody>
-      </p:sp>
-      <p:sp>
-        <p:nvSpPr>
-          <p:cNvPr id="255" name="Rectángulo 254" descr="Nodo de cuarto nivel&#10;" title="Nodo04"/>
-          <p:cNvSpPr/>
-          <p:nvPr/>
-        </p:nvSpPr>
-        <p:spPr>
-          <a:xfrm>
-            <a:off x="2464668" y="4371695"/>
-            <a:ext cx="747648" cy="560675"/>
-          </a:xfrm>
-          <a:prstGeom prst="rect">
-            <a:avLst/>
-          </a:prstGeom>
-          <a:noFill/>
-          <a:ln>
-            <a:solidFill>
-              <a:schemeClr val="tx1"/>
-            </a:solidFill>
-          </a:ln>
-        </p:spPr>
-        <p:style>
-          <a:lnRef idx="2">
-            <a:schemeClr val="accent6"/>
-          </a:lnRef>
-          <a:fillRef idx="1">
-            <a:schemeClr val="lt1"/>
-          </a:fillRef>
-          <a:effectRef idx="0">
-            <a:schemeClr val="accent6"/>
-          </a:effectRef>
-          <a:fontRef idx="minor">
-            <a:schemeClr val="dk1"/>
-          </a:fontRef>
-        </p:style>
-        <p:txBody>
-          <a:bodyPr rtlCol="0" anchor="ctr"/>
-          <a:lstStyle/>
-          <a:p>
-            <a:pPr algn="ctr"/>
-            <a:endParaRPr lang="es-ES" sz="800" baseline="30000" dirty="0">
-              <a:solidFill>
-                <a:schemeClr val="tx1"/>
-              </a:solidFill>
-              <a:latin typeface="Arial" panose="020B0604020202020204" pitchFamily="34" charset="0"/>
-              <a:cs typeface="Arial" panose="020B0604020202020204" pitchFamily="34" charset="0"/>
-            </a:endParaRPr>
-          </a:p>
-        </p:txBody>
-      </p:sp>
-      <p:cxnSp>
-        <p:nvCxnSpPr>
-          <p:cNvPr id="288" name="Conector angular 287"/>
-          <p:cNvCxnSpPr>
-            <a:stCxn id="535" idx="2"/>
-            <a:endCxn id="289" idx="0"/>
-          </p:cNvCxnSpPr>
-          <p:nvPr/>
-        </p:nvCxnSpPr>
-        <p:spPr>
-          <a:xfrm rot="16200000" flipH="1">
-            <a:off x="2661346" y="3731980"/>
-            <a:ext cx="290275" cy="17543"/>
-          </a:xfrm>
-          <a:prstGeom prst="bentConnector3">
-            <a:avLst>
-              <a:gd name="adj1" fmla="val 2226"/>
-            </a:avLst>
-          </a:prstGeom>
-          <a:ln w="12700">
-            <a:solidFill>
-              <a:schemeClr val="tx1"/>
-            </a:solidFill>
-          </a:ln>
-        </p:spPr>
-        <p:style>
-          <a:lnRef idx="1">
-            <a:schemeClr val="accent1"/>
-          </a:lnRef>
-          <a:fillRef idx="0">
-            <a:schemeClr val="accent1"/>
-          </a:fillRef>
-          <a:effectRef idx="0">
-            <a:schemeClr val="accent1"/>
-          </a:effectRef>
-          <a:fontRef idx="minor">
-            <a:schemeClr val="tx1"/>
-          </a:fontRef>
-        </p:style>
-      </p:cxnSp>
-      <p:sp>
-        <p:nvSpPr>
-          <p:cNvPr id="289" name="CuadroTexto 288" descr="Conector entre nodos" title="conector"/>
-          <p:cNvSpPr txBox="1"/>
-          <p:nvPr/>
-        </p:nvSpPr>
-        <p:spPr>
-          <a:xfrm>
-            <a:off x="2396025" y="3885890"/>
-            <a:ext cx="838459" cy="215444"/>
-          </a:xfrm>
-          <a:prstGeom prst="rect">
-            <a:avLst/>
-          </a:prstGeom>
-          <a:noFill/>
-        </p:spPr>
-        <p:txBody>
-          <a:bodyPr wrap="square" rtlCol="0">
-            <a:spAutoFit/>
-          </a:bodyPr>
-          <a:lstStyle/>
-          <a:p>
-            <a:pPr algn="ctr"/>
-            <a:r>
-              <a:rPr lang="es-ES" sz="800" dirty="0" smtClean="0">
-                <a:latin typeface="Arial" panose="020B0604020202020204" pitchFamily="34" charset="0"/>
-                <a:cs typeface="Arial" panose="020B0604020202020204" pitchFamily="34" charset="0"/>
-              </a:rPr>
-              <a:t>se desarrolla</a:t>
-            </a:r>
-            <a:endParaRPr lang="es-ES" sz="800" dirty="0">
-              <a:latin typeface="Arial" panose="020B0604020202020204" pitchFamily="34" charset="0"/>
-              <a:cs typeface="Arial" panose="020B0604020202020204" pitchFamily="34" charset="0"/>
-            </a:endParaRPr>
-          </a:p>
-        </p:txBody>
-      </p:sp>
-      <p:cxnSp>
-        <p:nvCxnSpPr>
-          <p:cNvPr id="290" name="Conector angular 289"/>
-          <p:cNvCxnSpPr>
-            <a:endCxn id="255" idx="0"/>
-          </p:cNvCxnSpPr>
-          <p:nvPr/>
-        </p:nvCxnSpPr>
-        <p:spPr>
-          <a:xfrm rot="16200000" flipH="1">
-            <a:off x="2661203" y="4194406"/>
-            <a:ext cx="335838" cy="18739"/>
-          </a:xfrm>
-          <a:prstGeom prst="bentConnector3">
-            <a:avLst>
-              <a:gd name="adj1" fmla="val 50000"/>
-            </a:avLst>
-          </a:prstGeom>
-          <a:ln w="12700">
-            <a:solidFill>
-              <a:schemeClr val="tx1"/>
-            </a:solidFill>
-          </a:ln>
-        </p:spPr>
-        <p:style>
-          <a:lnRef idx="1">
-            <a:schemeClr val="accent1"/>
-          </a:lnRef>
-          <a:fillRef idx="0">
-            <a:schemeClr val="accent1"/>
-          </a:fillRef>
-          <a:effectRef idx="0">
-            <a:schemeClr val="accent1"/>
-          </a:effectRef>
-          <a:fontRef idx="minor">
-            <a:schemeClr val="tx1"/>
-          </a:fontRef>
-        </p:style>
-      </p:cxnSp>
-      <p:cxnSp>
-        <p:nvCxnSpPr>
-          <p:cNvPr id="291" name="Conector angular 290"/>
-          <p:cNvCxnSpPr/>
-          <p:nvPr/>
-        </p:nvCxnSpPr>
-        <p:spPr>
-          <a:xfrm rot="5400000">
-            <a:off x="3344069" y="4252199"/>
-            <a:ext cx="1077129" cy="28097"/>
-          </a:xfrm>
-          <a:prstGeom prst="bentConnector3">
-            <a:avLst>
-              <a:gd name="adj1" fmla="val 978"/>
-            </a:avLst>
-          </a:prstGeom>
-          <a:ln w="12700">
-            <a:solidFill>
-              <a:schemeClr val="tx1"/>
-            </a:solidFill>
-          </a:ln>
-        </p:spPr>
-        <p:style>
-          <a:lnRef idx="1">
-            <a:schemeClr val="accent1"/>
-          </a:lnRef>
-          <a:fillRef idx="0">
-            <a:schemeClr val="accent1"/>
-          </a:fillRef>
-          <a:effectRef idx="0">
-            <a:schemeClr val="accent1"/>
-          </a:effectRef>
-          <a:fontRef idx="minor">
-            <a:schemeClr val="tx1"/>
-          </a:fontRef>
-        </p:style>
-      </p:cxnSp>
-      <p:sp>
-        <p:nvSpPr>
-          <p:cNvPr id="292" name="Rectángulo 291" descr="Nodo de cuarto nivel&#10;" title="Nodo04"/>
-          <p:cNvSpPr/>
-          <p:nvPr/>
-        </p:nvSpPr>
-        <p:spPr>
-          <a:xfrm>
-            <a:off x="3088538" y="5272378"/>
-            <a:ext cx="1369709" cy="193391"/>
-          </a:xfrm>
-          <a:prstGeom prst="rect">
-            <a:avLst/>
-          </a:prstGeom>
-          <a:noFill/>
-          <a:ln>
-            <a:solidFill>
-              <a:schemeClr val="tx1"/>
-            </a:solidFill>
-          </a:ln>
-        </p:spPr>
-        <p:style>
-          <a:lnRef idx="2">
-            <a:schemeClr val="accent6"/>
-          </a:lnRef>
-          <a:fillRef idx="1">
-            <a:schemeClr val="lt1"/>
-          </a:fillRef>
-          <a:effectRef idx="0">
-            <a:schemeClr val="accent6"/>
-          </a:effectRef>
-          <a:fontRef idx="minor">
-            <a:schemeClr val="dk1"/>
-          </a:fontRef>
-        </p:style>
-        <p:txBody>
-          <a:bodyPr rtlCol="0" anchor="ctr"/>
-          <a:lstStyle/>
-          <a:p>
-            <a:pPr algn="ctr"/>
-            <a:endParaRPr lang="es-ES" sz="800" dirty="0">
-              <a:solidFill>
-                <a:schemeClr val="tx1"/>
-              </a:solidFill>
-              <a:latin typeface="Arial" panose="020B0604020202020204" pitchFamily="34" charset="0"/>
-              <a:cs typeface="Arial" panose="020B0604020202020204" pitchFamily="34" charset="0"/>
-            </a:endParaRPr>
-          </a:p>
-        </p:txBody>
-      </p:sp>
-      <p:sp>
-        <p:nvSpPr>
-          <p:cNvPr id="293" name="Rectángulo 292" descr="Nodo de cuarto nivel&#10;" title="Nodo04"/>
-          <p:cNvSpPr/>
-          <p:nvPr/>
-        </p:nvSpPr>
-        <p:spPr>
-          <a:xfrm>
-            <a:off x="3532094" y="6167991"/>
-            <a:ext cx="2342777" cy="242329"/>
-          </a:xfrm>
-          <a:prstGeom prst="rect">
-            <a:avLst/>
-          </a:prstGeom>
-          <a:noFill/>
-          <a:ln>
-            <a:solidFill>
-              <a:schemeClr val="tx1"/>
-            </a:solidFill>
-          </a:ln>
-        </p:spPr>
-        <p:style>
-          <a:lnRef idx="2">
-            <a:schemeClr val="accent6"/>
-          </a:lnRef>
-          <a:fillRef idx="1">
-            <a:schemeClr val="lt1"/>
-          </a:fillRef>
-          <a:effectRef idx="0">
-            <a:schemeClr val="accent6"/>
-          </a:effectRef>
-          <a:fontRef idx="minor">
-            <a:schemeClr val="dk1"/>
-          </a:fontRef>
-        </p:style>
-        <p:txBody>
-          <a:bodyPr rtlCol="0" anchor="ctr"/>
-          <a:lstStyle/>
-          <a:p>
-            <a:pPr algn="ctr"/>
-            <a:endParaRPr lang="es-ES" sz="800" i="1" dirty="0">
-              <a:solidFill>
-                <a:schemeClr val="tx1"/>
-              </a:solidFill>
-              <a:latin typeface="Arial" panose="020B0604020202020204" pitchFamily="34" charset="0"/>
-              <a:cs typeface="Arial" panose="020B0604020202020204" pitchFamily="34" charset="0"/>
-            </a:endParaRPr>
-          </a:p>
-        </p:txBody>
-      </p:sp>
-      <p:cxnSp>
-        <p:nvCxnSpPr>
-          <p:cNvPr id="306" name="Conector angular 305"/>
-          <p:cNvCxnSpPr/>
-          <p:nvPr/>
-        </p:nvCxnSpPr>
-        <p:spPr>
-          <a:xfrm rot="16200000" flipH="1">
-            <a:off x="3753714" y="5129043"/>
-            <a:ext cx="196127" cy="9169"/>
-          </a:xfrm>
-          <a:prstGeom prst="bentConnector3">
-            <a:avLst>
-              <a:gd name="adj1" fmla="val 2318"/>
-            </a:avLst>
-          </a:prstGeom>
-          <a:ln w="12700">
-            <a:solidFill>
-              <a:schemeClr val="tx1"/>
-            </a:solidFill>
-          </a:ln>
-        </p:spPr>
-        <p:style>
-          <a:lnRef idx="1">
-            <a:schemeClr val="accent1"/>
-          </a:lnRef>
-          <a:fillRef idx="0">
-            <a:schemeClr val="accent1"/>
-          </a:fillRef>
-          <a:effectRef idx="0">
-            <a:schemeClr val="accent1"/>
-          </a:effectRef>
-          <a:fontRef idx="minor">
-            <a:schemeClr val="tx1"/>
-          </a:fontRef>
-        </p:style>
-      </p:cxnSp>
-      <p:cxnSp>
-        <p:nvCxnSpPr>
-          <p:cNvPr id="321" name="Conector angular 320"/>
-          <p:cNvCxnSpPr/>
-          <p:nvPr/>
-        </p:nvCxnSpPr>
-        <p:spPr>
-          <a:xfrm rot="16200000" flipH="1">
-            <a:off x="4169956" y="5417519"/>
-            <a:ext cx="1400860" cy="74234"/>
-          </a:xfrm>
-          <a:prstGeom prst="bentConnector3">
-            <a:avLst>
-              <a:gd name="adj1" fmla="val 100769"/>
-            </a:avLst>
-          </a:prstGeom>
-          <a:ln w="12700">
-            <a:solidFill>
-              <a:schemeClr val="tx1"/>
-            </a:solidFill>
-          </a:ln>
-        </p:spPr>
-        <p:style>
-          <a:lnRef idx="1">
-            <a:schemeClr val="accent1"/>
-          </a:lnRef>
-          <a:fillRef idx="0">
-            <a:schemeClr val="accent1"/>
-          </a:fillRef>
-          <a:effectRef idx="0">
-            <a:schemeClr val="accent1"/>
-          </a:effectRef>
-          <a:fontRef idx="minor">
-            <a:schemeClr val="tx1"/>
-          </a:fontRef>
-        </p:style>
-      </p:cxnSp>
-      <p:cxnSp>
-        <p:nvCxnSpPr>
-          <p:cNvPr id="326" name="Conector angular 325"/>
-          <p:cNvCxnSpPr/>
-          <p:nvPr/>
-        </p:nvCxnSpPr>
-        <p:spPr>
-          <a:xfrm rot="16200000" flipH="1">
-            <a:off x="4745325" y="4500476"/>
-            <a:ext cx="196127" cy="9169"/>
-          </a:xfrm>
-          <a:prstGeom prst="bentConnector3">
-            <a:avLst>
-              <a:gd name="adj1" fmla="val 2318"/>
-            </a:avLst>
-          </a:prstGeom>
-          <a:ln w="12700">
-            <a:solidFill>
-              <a:schemeClr val="tx1"/>
-            </a:solidFill>
-          </a:ln>
-        </p:spPr>
-        <p:style>
-          <a:lnRef idx="1">
-            <a:schemeClr val="accent1"/>
-          </a:lnRef>
-          <a:fillRef idx="0">
-            <a:schemeClr val="accent1"/>
-          </a:fillRef>
-          <a:effectRef idx="0">
-            <a:schemeClr val="accent1"/>
-          </a:effectRef>
-          <a:fontRef idx="minor">
-            <a:schemeClr val="tx1"/>
-          </a:fontRef>
-        </p:style>
-      </p:cxnSp>
       <p:cxnSp>
         <p:nvCxnSpPr>
           <p:cNvPr id="336" name="Conector angular 335"/>
@@ -4336,123 +3645,6 @@
       </p:cxnSp>
       <p:cxnSp>
         <p:nvCxnSpPr>
-          <p:cNvPr id="408" name="Conector angular 407"/>
-          <p:cNvCxnSpPr>
-            <a:stCxn id="244" idx="2"/>
-            <a:endCxn id="254" idx="0"/>
-          </p:cNvCxnSpPr>
-          <p:nvPr/>
-        </p:nvCxnSpPr>
-        <p:spPr>
-          <a:xfrm rot="16200000" flipH="1">
-            <a:off x="1487103" y="4607328"/>
-            <a:ext cx="658006" cy="28919"/>
-          </a:xfrm>
-          <a:prstGeom prst="bentConnector3">
-            <a:avLst>
-              <a:gd name="adj1" fmla="val 99955"/>
-            </a:avLst>
-          </a:prstGeom>
-          <a:ln w="12700">
-            <a:solidFill>
-              <a:schemeClr val="tx1"/>
-            </a:solidFill>
-          </a:ln>
-        </p:spPr>
-        <p:style>
-          <a:lnRef idx="1">
-            <a:schemeClr val="accent1"/>
-          </a:lnRef>
-          <a:fillRef idx="0">
-            <a:schemeClr val="accent1"/>
-          </a:fillRef>
-          <a:effectRef idx="0">
-            <a:schemeClr val="accent1"/>
-          </a:effectRef>
-          <a:fontRef idx="minor">
-            <a:schemeClr val="tx1"/>
-          </a:fontRef>
-        </p:style>
-      </p:cxnSp>
-      <p:cxnSp>
-        <p:nvCxnSpPr>
-          <p:cNvPr id="409" name="Conector angular 408"/>
-          <p:cNvCxnSpPr>
-            <a:stCxn id="533" idx="2"/>
-            <a:endCxn id="244" idx="0"/>
-          </p:cNvCxnSpPr>
-          <p:nvPr/>
-        </p:nvCxnSpPr>
-        <p:spPr>
-          <a:xfrm rot="5400000">
-            <a:off x="1760351" y="3971034"/>
-            <a:ext cx="147604" cy="65011"/>
-          </a:xfrm>
-          <a:prstGeom prst="bentConnector3">
-            <a:avLst>
-              <a:gd name="adj1" fmla="val 1413"/>
-            </a:avLst>
-          </a:prstGeom>
-          <a:ln w="12700">
-            <a:solidFill>
-              <a:schemeClr val="tx1"/>
-            </a:solidFill>
-          </a:ln>
-        </p:spPr>
-        <p:style>
-          <a:lnRef idx="1">
-            <a:schemeClr val="accent1"/>
-          </a:lnRef>
-          <a:fillRef idx="0">
-            <a:schemeClr val="accent1"/>
-          </a:fillRef>
-          <a:effectRef idx="0">
-            <a:schemeClr val="accent1"/>
-          </a:effectRef>
-          <a:fontRef idx="minor">
-            <a:schemeClr val="tx1"/>
-          </a:fontRef>
-        </p:style>
-      </p:cxnSp>
-      <p:cxnSp>
-        <p:nvCxnSpPr>
-          <p:cNvPr id="414" name="Conector angular 413"/>
-          <p:cNvCxnSpPr/>
-          <p:nvPr/>
-        </p:nvCxnSpPr>
-        <p:spPr>
-          <a:xfrm rot="16200000" flipH="1">
-            <a:off x="642784" y="4318002"/>
-            <a:ext cx="196127" cy="9169"/>
-          </a:xfrm>
-          <a:prstGeom prst="bentConnector3">
-            <a:avLst>
-              <a:gd name="adj1" fmla="val 2318"/>
-            </a:avLst>
-          </a:prstGeom>
-          <a:ln w="12700">
-            <a:solidFill>
-              <a:schemeClr val="tx1"/>
-            </a:solidFill>
-          </a:ln>
-        </p:spPr>
-        <p:style>
-          <a:lnRef idx="1">
-            <a:schemeClr val="accent1"/>
-          </a:lnRef>
-          <a:fillRef idx="0">
-            <a:schemeClr val="accent1"/>
-          </a:fillRef>
-          <a:effectRef idx="0">
-            <a:schemeClr val="accent1"/>
-          </a:effectRef>
-          <a:fontRef idx="minor">
-            <a:schemeClr val="tx1"/>
-          </a:fontRef>
-        </p:style>
-      </p:cxnSp>
-      <p:cxnSp>
-        <p:nvCxnSpPr>
           <p:cNvPr id="424" name="Conector angular 423"/>
           <p:cNvCxnSpPr/>
           <p:nvPr/>
@@ -4488,296 +3680,102 @@
           </a:fontRef>
         </p:style>
       </p:cxnSp>
-      <p:sp>
-        <p:nvSpPr>
-          <p:cNvPr id="9" name="CuadroTexto 8"/>
-          <p:cNvSpPr txBox="1"/>
-          <p:nvPr/>
-        </p:nvSpPr>
+      <p:pic>
+        <p:nvPicPr>
+          <p:cNvPr id="18" name="Imagen 17"/>
+          <p:cNvPicPr>
+            <a:picLocks noChangeAspect="1"/>
+          </p:cNvPicPr>
+          <p:nvPr/>
+        </p:nvPicPr>
+        <p:blipFill>
+          <a:blip r:embed="rId2"/>
+          <a:stretch>
+            <a:fillRect/>
+          </a:stretch>
+        </p:blipFill>
         <p:spPr>
           <a:xfrm>
-            <a:off x="1200351" y="4942048"/>
-            <a:ext cx="1264317" cy="276999"/>
+            <a:off x="5710795" y="2846948"/>
+            <a:ext cx="647619" cy="180952"/>
           </a:xfrm>
           <a:prstGeom prst="rect">
             <a:avLst/>
           </a:prstGeom>
-          <a:noFill/>
-        </p:spPr>
-        <p:txBody>
-          <a:bodyPr wrap="square" rtlCol="0">
-            <a:spAutoFit/>
-          </a:bodyPr>
-          <a:lstStyle/>
-          <a:p>
-            <a:r>
-              <a:rPr lang="es-CO" sz="1200" dirty="0" smtClean="0"/>
-              <a:t>MA_08_03_008</a:t>
-            </a:r>
-            <a:endParaRPr lang="es-CO" dirty="0"/>
-          </a:p>
-        </p:txBody>
-      </p:sp>
-      <p:sp>
-        <p:nvSpPr>
-          <p:cNvPr id="103" name="CuadroTexto 102"/>
-          <p:cNvSpPr txBox="1"/>
-          <p:nvPr/>
-        </p:nvSpPr>
+        </p:spPr>
+      </p:pic>
+      <p:pic>
+        <p:nvPicPr>
+          <p:cNvPr id="19" name="Imagen 18"/>
+          <p:cNvPicPr>
+            <a:picLocks noChangeAspect="1"/>
+          </p:cNvPicPr>
+          <p:nvPr/>
+        </p:nvPicPr>
+        <p:blipFill>
+          <a:blip r:embed="rId3"/>
+          <a:stretch>
+            <a:fillRect/>
+          </a:stretch>
+        </p:blipFill>
         <p:spPr>
           <a:xfrm>
-            <a:off x="77385" y="4439832"/>
-            <a:ext cx="1962535" cy="553998"/>
+            <a:off x="6661194" y="3274302"/>
+            <a:ext cx="590476" cy="371429"/>
           </a:xfrm>
           <a:prstGeom prst="rect">
             <a:avLst/>
           </a:prstGeom>
-          <a:noFill/>
-        </p:spPr>
-        <p:txBody>
-          <a:bodyPr wrap="square" rtlCol="0">
-            <a:spAutoFit/>
-          </a:bodyPr>
-          <a:lstStyle/>
-          <a:p>
-            <a:r>
-              <a:rPr lang="es-CO" sz="1200" dirty="0" smtClean="0"/>
-              <a:t>MA_08_03_006</a:t>
-            </a:r>
-          </a:p>
-          <a:p>
-            <a:r>
-              <a:rPr lang="es-CO" sz="1200" dirty="0" smtClean="0"/>
-              <a:t>MA_08_03_007</a:t>
-            </a:r>
-            <a:r>
-              <a:rPr lang="es-CO" dirty="0" smtClean="0"/>
-              <a:t> </a:t>
-            </a:r>
-            <a:endParaRPr lang="es-CO" dirty="0"/>
-          </a:p>
-        </p:txBody>
-      </p:sp>
-      <p:sp>
-        <p:nvSpPr>
-          <p:cNvPr id="104" name="CuadroTexto 103"/>
-          <p:cNvSpPr txBox="1"/>
-          <p:nvPr/>
-        </p:nvSpPr>
+        </p:spPr>
+      </p:pic>
+      <p:pic>
+        <p:nvPicPr>
+          <p:cNvPr id="21" name="Imagen 20"/>
+          <p:cNvPicPr>
+            <a:picLocks noChangeAspect="1"/>
+          </p:cNvPicPr>
+          <p:nvPr/>
+        </p:nvPicPr>
+        <p:blipFill>
+          <a:blip r:embed="rId4"/>
+          <a:stretch>
+            <a:fillRect/>
+          </a:stretch>
+        </p:blipFill>
         <p:spPr>
           <a:xfrm>
-            <a:off x="2276518" y="4385995"/>
-            <a:ext cx="1962535" cy="553998"/>
+            <a:off x="7448239" y="3282521"/>
+            <a:ext cx="590476" cy="371429"/>
           </a:xfrm>
           <a:prstGeom prst="rect">
             <a:avLst/>
           </a:prstGeom>
-          <a:noFill/>
-        </p:spPr>
-        <p:txBody>
-          <a:bodyPr wrap="square" rtlCol="0">
-            <a:spAutoFit/>
-          </a:bodyPr>
-          <a:lstStyle/>
-          <a:p>
-            <a:r>
-              <a:rPr lang="es-CO" sz="1200" dirty="0" smtClean="0"/>
-              <a:t>MA_08_03_009</a:t>
-            </a:r>
-          </a:p>
-          <a:p>
-            <a:r>
-              <a:rPr lang="es-CO" sz="1200" dirty="0" smtClean="0"/>
-              <a:t>MA_08_03_010</a:t>
-            </a:r>
-            <a:r>
-              <a:rPr lang="es-CO" dirty="0" smtClean="0"/>
-              <a:t> </a:t>
-            </a:r>
-            <a:endParaRPr lang="es-CO" dirty="0"/>
-          </a:p>
-        </p:txBody>
-      </p:sp>
-      <p:sp>
-        <p:nvSpPr>
-          <p:cNvPr id="105" name="CuadroTexto 104"/>
-          <p:cNvSpPr txBox="1"/>
-          <p:nvPr/>
-        </p:nvSpPr>
+        </p:spPr>
+      </p:pic>
+      <p:pic>
+        <p:nvPicPr>
+          <p:cNvPr id="25" name="Imagen 24"/>
+          <p:cNvPicPr>
+            <a:picLocks noChangeAspect="1"/>
+          </p:cNvPicPr>
+          <p:nvPr/>
+        </p:nvPicPr>
+        <p:blipFill>
+          <a:blip r:embed="rId5"/>
+          <a:stretch>
+            <a:fillRect/>
+          </a:stretch>
+        </p:blipFill>
         <p:spPr>
           <a:xfrm>
-            <a:off x="3192263" y="5224654"/>
-            <a:ext cx="1264317" cy="276999"/>
+            <a:off x="8255436" y="3278751"/>
+            <a:ext cx="600000" cy="371429"/>
           </a:xfrm>
           <a:prstGeom prst="rect">
             <a:avLst/>
           </a:prstGeom>
-          <a:noFill/>
-        </p:spPr>
-        <p:txBody>
-          <a:bodyPr wrap="square" rtlCol="0">
-            <a:spAutoFit/>
-          </a:bodyPr>
-          <a:lstStyle/>
-          <a:p>
-            <a:r>
-              <a:rPr lang="es-CO" sz="1200" dirty="0" smtClean="0"/>
-              <a:t>MA_08_03_011</a:t>
-            </a:r>
-            <a:endParaRPr lang="es-CO" dirty="0"/>
-          </a:p>
-        </p:txBody>
-      </p:sp>
-      <p:sp>
-        <p:nvSpPr>
-          <p:cNvPr id="106" name="CuadroTexto 105"/>
-          <p:cNvSpPr txBox="1"/>
-          <p:nvPr/>
-        </p:nvSpPr>
-        <p:spPr>
-          <a:xfrm>
-            <a:off x="3972848" y="6167991"/>
-            <a:ext cx="1264317" cy="276999"/>
-          </a:xfrm>
-          <a:prstGeom prst="rect">
-            <a:avLst/>
-          </a:prstGeom>
-          <a:noFill/>
-        </p:spPr>
-        <p:txBody>
-          <a:bodyPr wrap="square" rtlCol="0">
-            <a:spAutoFit/>
-          </a:bodyPr>
-          <a:lstStyle/>
-          <a:p>
-            <a:r>
-              <a:rPr lang="es-CO" sz="1200" dirty="0" smtClean="0"/>
-              <a:t>MA_08_03_012</a:t>
-            </a:r>
-            <a:endParaRPr lang="es-CO" dirty="0"/>
-          </a:p>
-        </p:txBody>
-      </p:sp>
-      <p:sp>
-        <p:nvSpPr>
-          <p:cNvPr id="107" name="CuadroTexto 106"/>
-          <p:cNvSpPr txBox="1"/>
-          <p:nvPr/>
-        </p:nvSpPr>
-        <p:spPr>
-          <a:xfrm>
-            <a:off x="5453334" y="2771960"/>
-            <a:ext cx="1264317" cy="276999"/>
-          </a:xfrm>
-          <a:prstGeom prst="rect">
-            <a:avLst/>
-          </a:prstGeom>
-          <a:noFill/>
-        </p:spPr>
-        <p:txBody>
-          <a:bodyPr wrap="square" rtlCol="0">
-            <a:spAutoFit/>
-          </a:bodyPr>
-          <a:lstStyle/>
-          <a:p>
-            <a:r>
-              <a:rPr lang="es-CO" sz="1200" dirty="0" smtClean="0"/>
-              <a:t>MA_08_03_013</a:t>
-            </a:r>
-            <a:endParaRPr lang="es-CO" dirty="0"/>
-          </a:p>
-        </p:txBody>
-      </p:sp>
-      <p:sp>
-        <p:nvSpPr>
-          <p:cNvPr id="108" name="CuadroTexto 107"/>
-          <p:cNvSpPr txBox="1"/>
-          <p:nvPr/>
-        </p:nvSpPr>
-        <p:spPr>
-          <a:xfrm>
-            <a:off x="6393357" y="3348717"/>
-            <a:ext cx="1264317" cy="276999"/>
-          </a:xfrm>
-          <a:prstGeom prst="rect">
-            <a:avLst/>
-          </a:prstGeom>
-          <a:noFill/>
-        </p:spPr>
-        <p:txBody>
-          <a:bodyPr wrap="square" rtlCol="0">
-            <a:spAutoFit/>
-          </a:bodyPr>
-          <a:lstStyle/>
-          <a:p>
-            <a:r>
-              <a:rPr lang="es-CO" sz="1200" dirty="0" smtClean="0"/>
-              <a:t>MA_08_03_014</a:t>
-            </a:r>
-            <a:endParaRPr lang="es-CO" dirty="0"/>
-          </a:p>
-        </p:txBody>
-      </p:sp>
-      <p:sp>
-        <p:nvSpPr>
-          <p:cNvPr id="109" name="CuadroTexto 108"/>
-          <p:cNvSpPr txBox="1"/>
-          <p:nvPr/>
-        </p:nvSpPr>
-        <p:spPr>
-          <a:xfrm>
-            <a:off x="7119337" y="3514081"/>
-            <a:ext cx="1264317" cy="276999"/>
-          </a:xfrm>
-          <a:prstGeom prst="rect">
-            <a:avLst/>
-          </a:prstGeom>
-          <a:noFill/>
-        </p:spPr>
-        <p:txBody>
-          <a:bodyPr wrap="square" rtlCol="0">
-            <a:spAutoFit/>
-          </a:bodyPr>
-          <a:lstStyle/>
-          <a:p>
-            <a:r>
-              <a:rPr lang="es-CO" sz="1200" dirty="0" smtClean="0"/>
-              <a:t>MA_08_03_015</a:t>
-            </a:r>
-            <a:endParaRPr lang="es-CO" dirty="0"/>
-          </a:p>
-        </p:txBody>
-      </p:sp>
-      <p:sp>
-        <p:nvSpPr>
-          <p:cNvPr id="110" name="CuadroTexto 109"/>
-          <p:cNvSpPr txBox="1"/>
-          <p:nvPr/>
-        </p:nvSpPr>
-        <p:spPr>
-          <a:xfrm>
-            <a:off x="8019021" y="3325966"/>
-            <a:ext cx="1264317" cy="276999"/>
-          </a:xfrm>
-          <a:prstGeom prst="rect">
-            <a:avLst/>
-          </a:prstGeom>
-          <a:noFill/>
-        </p:spPr>
-        <p:txBody>
-          <a:bodyPr wrap="square" rtlCol="0">
-            <a:spAutoFit/>
-          </a:bodyPr>
-          <a:lstStyle/>
-          <a:p>
-            <a:r>
-              <a:rPr lang="es-CO" sz="1200" dirty="0" smtClean="0"/>
-              <a:t>MA_08_03_016</a:t>
-            </a:r>
-            <a:endParaRPr lang="es-CO" dirty="0"/>
-          </a:p>
-        </p:txBody>
-      </p:sp>
+        </p:spPr>
+      </p:pic>
     </p:spTree>
     <p:extLst>
       <p:ext uri="{BB962C8B-B14F-4D97-AF65-F5344CB8AC3E}">

</xml_diff>